<commit_message>
Update IDS Project – Adult Dataset.pptx
</commit_message>
<xml_diff>
--- a/IDS Project – Adult Dataset.pptx
+++ b/IDS Project – Adult Dataset.pptx
@@ -10,6 +10,9 @@
     <p:sldId id="257" r:id="rId4"/>
     <p:sldId id="258" r:id="rId5"/>
     <p:sldId id="260" r:id="rId6"/>
+    <p:sldId id="261" r:id="rId7"/>
+    <p:sldId id="262" r:id="rId8"/>
+    <p:sldId id="263" r:id="rId9"/>
   </p:sldIdLst>
   <p:sldSz cx="12192000" cy="6858000"/>
   <p:notesSz cx="6858000" cy="9144000"/>
@@ -6186,7 +6189,12 @@
             <p:ph type="title"/>
           </p:nvPr>
         </p:nvSpPr>
-        <p:spPr/>
+        <p:spPr>
+          <a:xfrm>
+            <a:off x="677334" y="609600"/>
+            <a:ext cx="8952188" cy="1320800"/>
+          </a:xfrm>
+        </p:spPr>
         <p:txBody>
           <a:bodyPr/>
           <a:lstStyle/>
@@ -6231,6 +6239,274 @@
     <p:extLst>
       <p:ext uri="{BB962C8B-B14F-4D97-AF65-F5344CB8AC3E}">
         <p14:creationId xmlns:p14="http://schemas.microsoft.com/office/powerpoint/2010/main" val="1992714447"/>
+      </p:ext>
+    </p:extLst>
+  </p:cSld>
+  <p:clrMapOvr>
+    <a:masterClrMapping/>
+  </p:clrMapOvr>
+</p:sld>
+</file>
+
+<file path=ppt/slides/slide6.xml><?xml version="1.0" encoding="utf-8"?>
+<p:sld xmlns:a="http://schemas.openxmlformats.org/drawingml/2006/main" xmlns:r="http://schemas.openxmlformats.org/officeDocument/2006/relationships" xmlns:p="http://schemas.openxmlformats.org/presentationml/2006/main">
+  <p:cSld>
+    <p:spTree>
+      <p:nvGrpSpPr>
+        <p:cNvPr id="1" name=""/>
+        <p:cNvGrpSpPr/>
+        <p:nvPr/>
+      </p:nvGrpSpPr>
+      <p:grpSpPr>
+        <a:xfrm>
+          <a:off x="0" y="0"/>
+          <a:ext cx="0" cy="0"/>
+          <a:chOff x="0" y="0"/>
+          <a:chExt cx="0" cy="0"/>
+        </a:xfrm>
+      </p:grpSpPr>
+      <p:sp>
+        <p:nvSpPr>
+          <p:cNvPr id="2" name="Title 1">
+            <a:extLst>
+              <a:ext uri="{FF2B5EF4-FFF2-40B4-BE49-F238E27FC236}">
+                <a16:creationId xmlns:a16="http://schemas.microsoft.com/office/drawing/2014/main" id="{CC18AA0E-783C-4220-B2AE-EDE62B919AA5}"/>
+              </a:ext>
+            </a:extLst>
+          </p:cNvPr>
+          <p:cNvSpPr>
+            <a:spLocks noGrp="1"/>
+          </p:cNvSpPr>
+          <p:nvPr>
+            <p:ph type="title"/>
+          </p:nvPr>
+        </p:nvSpPr>
+        <p:spPr/>
+        <p:txBody>
+          <a:bodyPr/>
+          <a:lstStyle/>
+          <a:p>
+            <a:r>
+              <a:rPr lang="en-US" dirty="0"/>
+              <a:t>Aim</a:t>
+            </a:r>
+          </a:p>
+        </p:txBody>
+      </p:sp>
+      <p:sp>
+        <p:nvSpPr>
+          <p:cNvPr id="3" name="Content Placeholder 2">
+            <a:extLst>
+              <a:ext uri="{FF2B5EF4-FFF2-40B4-BE49-F238E27FC236}">
+                <a16:creationId xmlns:a16="http://schemas.microsoft.com/office/drawing/2014/main" id="{CAE92B60-3AA7-4A43-96C0-A088CB92BF48}"/>
+              </a:ext>
+            </a:extLst>
+          </p:cNvPr>
+          <p:cNvSpPr>
+            <a:spLocks noGrp="1"/>
+          </p:cNvSpPr>
+          <p:nvPr>
+            <p:ph idx="1"/>
+          </p:nvPr>
+        </p:nvSpPr>
+        <p:spPr/>
+        <p:txBody>
+          <a:bodyPr/>
+          <a:lstStyle/>
+          <a:p>
+            <a:r>
+              <a:rPr lang="en-US" dirty="0"/>
+              <a:t>The aim of this dataset is to predict whether income is greater than or less than 50K USD</a:t>
+            </a:r>
+          </a:p>
+          <a:p>
+            <a:r>
+              <a:rPr lang="en-US" dirty="0"/>
+              <a:t>Now that we have a basic idea of the dataset, we have to find the columns with the maximum correlation</a:t>
+            </a:r>
+          </a:p>
+          <a:p>
+            <a:endParaRPr lang="en-US" dirty="0"/>
+          </a:p>
+          <a:p>
+            <a:endParaRPr lang="en-US" dirty="0"/>
+          </a:p>
+        </p:txBody>
+      </p:sp>
+    </p:spTree>
+    <p:extLst>
+      <p:ext uri="{BB962C8B-B14F-4D97-AF65-F5344CB8AC3E}">
+        <p14:creationId xmlns:p14="http://schemas.microsoft.com/office/powerpoint/2010/main" val="2808637522"/>
+      </p:ext>
+    </p:extLst>
+  </p:cSld>
+  <p:clrMapOvr>
+    <a:masterClrMapping/>
+  </p:clrMapOvr>
+</p:sld>
+</file>
+
+<file path=ppt/slides/slide7.xml><?xml version="1.0" encoding="utf-8"?>
+<p:sld xmlns:a="http://schemas.openxmlformats.org/drawingml/2006/main" xmlns:r="http://schemas.openxmlformats.org/officeDocument/2006/relationships" xmlns:p="http://schemas.openxmlformats.org/presentationml/2006/main">
+  <p:cSld>
+    <p:spTree>
+      <p:nvGrpSpPr>
+        <p:cNvPr id="1" name=""/>
+        <p:cNvGrpSpPr/>
+        <p:nvPr/>
+      </p:nvGrpSpPr>
+      <p:grpSpPr>
+        <a:xfrm>
+          <a:off x="0" y="0"/>
+          <a:ext cx="0" cy="0"/>
+          <a:chOff x="0" y="0"/>
+          <a:chExt cx="0" cy="0"/>
+        </a:xfrm>
+      </p:grpSpPr>
+      <p:sp>
+        <p:nvSpPr>
+          <p:cNvPr id="2" name="Title 1">
+            <a:extLst>
+              <a:ext uri="{FF2B5EF4-FFF2-40B4-BE49-F238E27FC236}">
+                <a16:creationId xmlns:a16="http://schemas.microsoft.com/office/drawing/2014/main" id="{D5F74131-5522-4B0C-A7C9-74750CC2D20C}"/>
+              </a:ext>
+            </a:extLst>
+          </p:cNvPr>
+          <p:cNvSpPr>
+            <a:spLocks noGrp="1"/>
+          </p:cNvSpPr>
+          <p:nvPr>
+            <p:ph type="title"/>
+          </p:nvPr>
+        </p:nvSpPr>
+        <p:spPr/>
+        <p:txBody>
+          <a:bodyPr/>
+          <a:lstStyle/>
+          <a:p>
+            <a:r>
+              <a:rPr lang="en-US" dirty="0"/>
+              <a:t>Correlation Matrix</a:t>
+            </a:r>
+          </a:p>
+        </p:txBody>
+      </p:sp>
+      <p:pic>
+        <p:nvPicPr>
+          <p:cNvPr id="4" name="Content Placeholder 3">
+            <a:extLst>
+              <a:ext uri="{FF2B5EF4-FFF2-40B4-BE49-F238E27FC236}">
+                <a16:creationId xmlns:a16="http://schemas.microsoft.com/office/drawing/2014/main" id="{EDCB13F8-0A69-48B4-A349-B77CA548ABF0}"/>
+              </a:ext>
+            </a:extLst>
+          </p:cNvPr>
+          <p:cNvPicPr>
+            <a:picLocks noGrp="1" noChangeAspect="1"/>
+          </p:cNvPicPr>
+          <p:nvPr>
+            <p:ph idx="1"/>
+          </p:nvPr>
+        </p:nvPicPr>
+        <p:blipFill>
+          <a:blip r:embed="rId2"/>
+          <a:stretch>
+            <a:fillRect/>
+          </a:stretch>
+        </p:blipFill>
+        <p:spPr>
+          <a:xfrm>
+            <a:off x="1252014" y="2051029"/>
+            <a:ext cx="6848113" cy="4192417"/>
+          </a:xfrm>
+          <a:prstGeom prst="rect">
+            <a:avLst/>
+          </a:prstGeom>
+        </p:spPr>
+      </p:pic>
+    </p:spTree>
+    <p:extLst>
+      <p:ext uri="{BB962C8B-B14F-4D97-AF65-F5344CB8AC3E}">
+        <p14:creationId xmlns:p14="http://schemas.microsoft.com/office/powerpoint/2010/main" val="3975547370"/>
+      </p:ext>
+    </p:extLst>
+  </p:cSld>
+  <p:clrMapOvr>
+    <a:masterClrMapping/>
+  </p:clrMapOvr>
+</p:sld>
+</file>
+
+<file path=ppt/slides/slide8.xml><?xml version="1.0" encoding="utf-8"?>
+<p:sld xmlns:a="http://schemas.openxmlformats.org/drawingml/2006/main" xmlns:r="http://schemas.openxmlformats.org/officeDocument/2006/relationships" xmlns:p="http://schemas.openxmlformats.org/presentationml/2006/main">
+  <p:cSld>
+    <p:spTree>
+      <p:nvGrpSpPr>
+        <p:cNvPr id="1" name=""/>
+        <p:cNvGrpSpPr/>
+        <p:nvPr/>
+      </p:nvGrpSpPr>
+      <p:grpSpPr>
+        <a:xfrm>
+          <a:off x="0" y="0"/>
+          <a:ext cx="0" cy="0"/>
+          <a:chOff x="0" y="0"/>
+          <a:chExt cx="0" cy="0"/>
+        </a:xfrm>
+      </p:grpSpPr>
+      <p:sp>
+        <p:nvSpPr>
+          <p:cNvPr id="2" name="Title 1">
+            <a:extLst>
+              <a:ext uri="{FF2B5EF4-FFF2-40B4-BE49-F238E27FC236}">
+                <a16:creationId xmlns:a16="http://schemas.microsoft.com/office/drawing/2014/main" id="{EC51A820-E19C-49E8-8831-8B02340680B5}"/>
+              </a:ext>
+            </a:extLst>
+          </p:cNvPr>
+          <p:cNvSpPr>
+            <a:spLocks noGrp="1"/>
+          </p:cNvSpPr>
+          <p:nvPr>
+            <p:ph type="title"/>
+          </p:nvPr>
+        </p:nvSpPr>
+        <p:spPr/>
+        <p:txBody>
+          <a:bodyPr/>
+          <a:lstStyle/>
+          <a:p>
+            <a:endParaRPr lang="en-US"/>
+          </a:p>
+        </p:txBody>
+      </p:sp>
+      <p:sp>
+        <p:nvSpPr>
+          <p:cNvPr id="3" name="Content Placeholder 2">
+            <a:extLst>
+              <a:ext uri="{FF2B5EF4-FFF2-40B4-BE49-F238E27FC236}">
+                <a16:creationId xmlns:a16="http://schemas.microsoft.com/office/drawing/2014/main" id="{EB9F23BB-DCFA-4B27-BB7F-EE19725306A2}"/>
+              </a:ext>
+            </a:extLst>
+          </p:cNvPr>
+          <p:cNvSpPr>
+            <a:spLocks noGrp="1"/>
+          </p:cNvSpPr>
+          <p:nvPr>
+            <p:ph idx="1"/>
+          </p:nvPr>
+        </p:nvSpPr>
+        <p:spPr/>
+        <p:txBody>
+          <a:bodyPr/>
+          <a:lstStyle/>
+          <a:p>
+            <a:endParaRPr lang="en-US"/>
+          </a:p>
+        </p:txBody>
+      </p:sp>
+    </p:spTree>
+    <p:extLst>
+      <p:ext uri="{BB962C8B-B14F-4D97-AF65-F5344CB8AC3E}">
+        <p14:creationId xmlns:p14="http://schemas.microsoft.com/office/powerpoint/2010/main" val="2793124800"/>
       </p:ext>
     </p:extLst>
   </p:cSld>

</xml_diff>

<commit_message>
Updated ipynb and ppt
</commit_message>
<xml_diff>
--- a/IDS Project – Adult Dataset.pptx
+++ b/IDS Project – Adult Dataset.pptx
@@ -2,7 +2,7 @@
 <file path=ppt/presentation.xml><?xml version="1.0" encoding="utf-8"?>
 <p:presentation xmlns:a="http://schemas.openxmlformats.org/drawingml/2006/main" xmlns:r="http://schemas.openxmlformats.org/officeDocument/2006/relationships" xmlns:p="http://schemas.openxmlformats.org/presentationml/2006/main" autoCompressPictures="0">
   <p:sldMasterIdLst>
-    <p:sldMasterId id="2147483648" r:id="rId1"/>
+    <p:sldMasterId id="2147483686" r:id="rId1"/>
   </p:sldMasterIdLst>
   <p:sldIdLst>
     <p:sldId id="256" r:id="rId2"/>
@@ -111,6 +111,11 @@
       </a:defRPr>
     </a:lvl9pPr>
   </p:defaultTextStyle>
+  <p:extLst>
+    <p:ext uri="{EFAFB233-063F-42B5-8137-9DF3F51BA10A}">
+      <p15:sldGuideLst xmlns:p15="http://schemas.microsoft.com/office/powerpoint/2012/main"/>
+    </p:ext>
+  </p:extLst>
 </p:presentation>
 </file>
 
@@ -715,7 +720,7 @@
           </a:lstStyle>
           <a:p>
             <a:r>
-              <a:rPr lang="en-US"/>
+              <a:rPr lang="en-US" smtClean="0"/>
               <a:t>Click to edit Master title style</a:t>
             </a:r>
             <a:endParaRPr lang="en-US" dirty="0"/>
@@ -835,7 +840,7 @@
           </a:lstStyle>
           <a:p>
             <a:r>
-              <a:rPr lang="en-US"/>
+              <a:rPr lang="en-US" smtClean="0"/>
               <a:t>Click to edit Master subtitle style</a:t>
             </a:r>
             <a:endParaRPr lang="en-US" dirty="0"/>
@@ -858,9 +863,9 @@
           <a:lstStyle/>
           <a:p>
             <a:fld id="{B61BEF0D-F0BB-DE4B-95CE-6DB70DBA9567}" type="datetimeFigureOut">
-              <a:rPr lang="en-US" dirty="0"/>
+              <a:rPr lang="en-US" smtClean="0"/>
               <a:pPr/>
-              <a:t>11/17/2019</a:t>
+              <a:t>11/20/2019</a:t>
             </a:fld>
             <a:endParaRPr lang="en-US" dirty="0"/>
           </a:p>
@@ -901,7 +906,7 @@
           <a:lstStyle/>
           <a:p>
             <a:fld id="{D57F1E4F-1CFF-5643-939E-217C01CDF565}" type="slidenum">
-              <a:rPr lang="en-US" dirty="0"/>
+              <a:rPr lang="en-US" smtClean="0"/>
               <a:pPr/>
               <a:t>‹#›</a:t>
             </a:fld>
@@ -910,6 +915,11 @@
         </p:txBody>
       </p:sp>
     </p:spTree>
+    <p:extLst>
+      <p:ext uri="{BB962C8B-B14F-4D97-AF65-F5344CB8AC3E}">
+        <p14:creationId xmlns:p14="http://schemas.microsoft.com/office/powerpoint/2010/main" val="2877484594"/>
+      </p:ext>
+    </p:extLst>
   </p:cSld>
   <p:clrMapOvr>
     <a:masterClrMapping/>
@@ -961,7 +971,7 @@
           </a:lstStyle>
           <a:p>
             <a:r>
-              <a:rPr lang="en-US"/>
+              <a:rPr lang="en-US" smtClean="0"/>
               <a:t>Click to edit Master title style</a:t>
             </a:r>
             <a:endParaRPr lang="en-US" dirty="0"/>
@@ -1084,8 +1094,8 @@
           <a:p>
             <a:pPr lvl="0"/>
             <a:r>
-              <a:rPr lang="en-US"/>
-              <a:t>Click to edit Master text styles</a:t>
+              <a:rPr lang="en-US" smtClean="0"/>
+              <a:t>Edit Master text styles</a:t>
             </a:r>
           </a:p>
         </p:txBody>
@@ -1106,9 +1116,9 @@
           <a:lstStyle/>
           <a:p>
             <a:fld id="{B61BEF0D-F0BB-DE4B-95CE-6DB70DBA9567}" type="datetimeFigureOut">
-              <a:rPr lang="en-US" dirty="0"/>
+              <a:rPr lang="en-US" smtClean="0"/>
               <a:pPr/>
-              <a:t>11/17/2019</a:t>
+              <a:t>11/20/2019</a:t>
             </a:fld>
             <a:endParaRPr lang="en-US" dirty="0"/>
           </a:p>
@@ -1149,7 +1159,7 @@
           <a:lstStyle/>
           <a:p>
             <a:fld id="{D57F1E4F-1CFF-5643-939E-217C01CDF565}" type="slidenum">
-              <a:rPr lang="en-US" dirty="0"/>
+              <a:rPr lang="en-US" smtClean="0"/>
               <a:pPr/>
               <a:t>‹#›</a:t>
             </a:fld>
@@ -1158,6 +1168,11 @@
         </p:txBody>
       </p:sp>
     </p:spTree>
+    <p:extLst>
+      <p:ext uri="{BB962C8B-B14F-4D97-AF65-F5344CB8AC3E}">
+        <p14:creationId xmlns:p14="http://schemas.microsoft.com/office/powerpoint/2010/main" val="408908375"/>
+      </p:ext>
+    </p:extLst>
   </p:cSld>
   <p:clrMapOvr>
     <a:masterClrMapping/>
@@ -1209,7 +1224,7 @@
           </a:lstStyle>
           <a:p>
             <a:r>
-              <a:rPr lang="en-US"/>
+              <a:rPr lang="en-US" smtClean="0"/>
               <a:t>Click to edit Master title style</a:t>
             </a:r>
             <a:endParaRPr lang="en-US" dirty="0"/>
@@ -1273,8 +1288,8 @@
           <a:p>
             <a:pPr lvl="0"/>
             <a:r>
-              <a:rPr lang="en-US"/>
-              <a:t>Click to edit Master text styles</a:t>
+              <a:rPr lang="en-US" smtClean="0"/>
+              <a:t>Edit Master text styles</a:t>
             </a:r>
           </a:p>
         </p:txBody>
@@ -1395,8 +1410,8 @@
           <a:p>
             <a:pPr lvl="0"/>
             <a:r>
-              <a:rPr lang="en-US"/>
-              <a:t>Click to edit Master text styles</a:t>
+              <a:rPr lang="en-US" smtClean="0"/>
+              <a:t>Edit Master text styles</a:t>
             </a:r>
           </a:p>
         </p:txBody>
@@ -1417,9 +1432,9 @@
           <a:lstStyle/>
           <a:p>
             <a:fld id="{B61BEF0D-F0BB-DE4B-95CE-6DB70DBA9567}" type="datetimeFigureOut">
-              <a:rPr lang="en-US" dirty="0"/>
+              <a:rPr lang="en-US" smtClean="0"/>
               <a:pPr/>
-              <a:t>11/17/2019</a:t>
+              <a:t>11/20/2019</a:t>
             </a:fld>
             <a:endParaRPr lang="en-US" dirty="0"/>
           </a:p>
@@ -1460,7 +1475,7 @@
           <a:lstStyle/>
           <a:p>
             <a:fld id="{D57F1E4F-1CFF-5643-939E-217C01CDF565}" type="slidenum">
-              <a:rPr lang="en-US" dirty="0"/>
+              <a:rPr lang="en-US" smtClean="0"/>
               <a:pPr/>
               <a:t>‹#›</a:t>
             </a:fld>
@@ -1551,6 +1566,11 @@
         </p:txBody>
       </p:sp>
     </p:spTree>
+    <p:extLst>
+      <p:ext uri="{BB962C8B-B14F-4D97-AF65-F5344CB8AC3E}">
+        <p14:creationId xmlns:p14="http://schemas.microsoft.com/office/powerpoint/2010/main" val="2863809808"/>
+      </p:ext>
+    </p:extLst>
   </p:cSld>
   <p:clrMapOvr>
     <a:masterClrMapping/>
@@ -1602,7 +1622,7 @@
           </a:lstStyle>
           <a:p>
             <a:r>
-              <a:rPr lang="en-US"/>
+              <a:rPr lang="en-US" smtClean="0"/>
               <a:t>Click to edit Master title style</a:t>
             </a:r>
             <a:endParaRPr lang="en-US" dirty="0"/>
@@ -1725,8 +1745,8 @@
           <a:p>
             <a:pPr lvl="0"/>
             <a:r>
-              <a:rPr lang="en-US"/>
-              <a:t>Click to edit Master text styles</a:t>
+              <a:rPr lang="en-US" smtClean="0"/>
+              <a:t>Edit Master text styles</a:t>
             </a:r>
           </a:p>
         </p:txBody>
@@ -1747,9 +1767,9 @@
           <a:lstStyle/>
           <a:p>
             <a:fld id="{B61BEF0D-F0BB-DE4B-95CE-6DB70DBA9567}" type="datetimeFigureOut">
-              <a:rPr lang="en-US" dirty="0"/>
+              <a:rPr lang="en-US" smtClean="0"/>
               <a:pPr/>
-              <a:t>11/17/2019</a:t>
+              <a:t>11/20/2019</a:t>
             </a:fld>
             <a:endParaRPr lang="en-US" dirty="0"/>
           </a:p>
@@ -1790,7 +1810,7 @@
           <a:lstStyle/>
           <a:p>
             <a:fld id="{D57F1E4F-1CFF-5643-939E-217C01CDF565}" type="slidenum">
-              <a:rPr lang="en-US" dirty="0"/>
+              <a:rPr lang="en-US" smtClean="0"/>
               <a:pPr/>
               <a:t>‹#›</a:t>
             </a:fld>
@@ -1799,6 +1819,11 @@
         </p:txBody>
       </p:sp>
     </p:spTree>
+    <p:extLst>
+      <p:ext uri="{BB962C8B-B14F-4D97-AF65-F5344CB8AC3E}">
+        <p14:creationId xmlns:p14="http://schemas.microsoft.com/office/powerpoint/2010/main" val="2515739330"/>
+      </p:ext>
+    </p:extLst>
   </p:cSld>
   <p:clrMapOvr>
     <a:masterClrMapping/>
@@ -1850,7 +1875,7 @@
           </a:lstStyle>
           <a:p>
             <a:r>
-              <a:rPr lang="en-US"/>
+              <a:rPr lang="en-US" smtClean="0"/>
               <a:t>Click to edit Master title style</a:t>
             </a:r>
             <a:endParaRPr lang="en-US" dirty="0"/>
@@ -1914,8 +1939,8 @@
           <a:p>
             <a:pPr lvl="0"/>
             <a:r>
-              <a:rPr lang="en-US"/>
-              <a:t>Click to edit Master text styles</a:t>
+              <a:rPr lang="en-US" smtClean="0"/>
+              <a:t>Edit Master text styles</a:t>
             </a:r>
           </a:p>
         </p:txBody>
@@ -2036,8 +2061,8 @@
           <a:p>
             <a:pPr lvl="0"/>
             <a:r>
-              <a:rPr lang="en-US"/>
-              <a:t>Click to edit Master text styles</a:t>
+              <a:rPr lang="en-US" smtClean="0"/>
+              <a:t>Edit Master text styles</a:t>
             </a:r>
           </a:p>
         </p:txBody>
@@ -2058,9 +2083,9 @@
           <a:lstStyle/>
           <a:p>
             <a:fld id="{B61BEF0D-F0BB-DE4B-95CE-6DB70DBA9567}" type="datetimeFigureOut">
-              <a:rPr lang="en-US" dirty="0"/>
+              <a:rPr lang="en-US" smtClean="0"/>
               <a:pPr/>
-              <a:t>11/17/2019</a:t>
+              <a:t>11/20/2019</a:t>
             </a:fld>
             <a:endParaRPr lang="en-US" dirty="0"/>
           </a:p>
@@ -2101,7 +2126,7 @@
           <a:lstStyle/>
           <a:p>
             <a:fld id="{D57F1E4F-1CFF-5643-939E-217C01CDF565}" type="slidenum">
-              <a:rPr lang="en-US" dirty="0"/>
+              <a:rPr lang="en-US" smtClean="0"/>
               <a:pPr/>
               <a:t>‹#›</a:t>
             </a:fld>
@@ -2192,6 +2217,11 @@
         </p:txBody>
       </p:sp>
     </p:spTree>
+    <p:extLst>
+      <p:ext uri="{BB962C8B-B14F-4D97-AF65-F5344CB8AC3E}">
+        <p14:creationId xmlns:p14="http://schemas.microsoft.com/office/powerpoint/2010/main" val="4242914493"/>
+      </p:ext>
+    </p:extLst>
   </p:cSld>
   <p:clrMapOvr>
     <a:masterClrMapping/>
@@ -2243,7 +2273,7 @@
           </a:lstStyle>
           <a:p>
             <a:r>
-              <a:rPr lang="en-US"/>
+              <a:rPr lang="en-US" smtClean="0"/>
               <a:t>Click to edit Master title style</a:t>
             </a:r>
             <a:endParaRPr lang="en-US" dirty="0"/>
@@ -2304,8 +2334,8 @@
           <a:p>
             <a:pPr lvl="0"/>
             <a:r>
-              <a:rPr lang="en-US"/>
-              <a:t>Click to edit Master text styles</a:t>
+              <a:rPr lang="en-US" smtClean="0"/>
+              <a:t>Edit Master text styles</a:t>
             </a:r>
           </a:p>
         </p:txBody>
@@ -2426,8 +2456,8 @@
           <a:p>
             <a:pPr lvl="0"/>
             <a:r>
-              <a:rPr lang="en-US"/>
-              <a:t>Click to edit Master text styles</a:t>
+              <a:rPr lang="en-US" smtClean="0"/>
+              <a:t>Edit Master text styles</a:t>
             </a:r>
           </a:p>
         </p:txBody>
@@ -2448,9 +2478,9 @@
           <a:lstStyle/>
           <a:p>
             <a:fld id="{B61BEF0D-F0BB-DE4B-95CE-6DB70DBA9567}" type="datetimeFigureOut">
-              <a:rPr lang="en-US" dirty="0"/>
+              <a:rPr lang="en-US" smtClean="0"/>
               <a:pPr/>
-              <a:t>11/17/2019</a:t>
+              <a:t>11/20/2019</a:t>
             </a:fld>
             <a:endParaRPr lang="en-US" dirty="0"/>
           </a:p>
@@ -2491,7 +2521,7 @@
           <a:lstStyle/>
           <a:p>
             <a:fld id="{D57F1E4F-1CFF-5643-939E-217C01CDF565}" type="slidenum">
-              <a:rPr lang="en-US" dirty="0"/>
+              <a:rPr lang="en-US" smtClean="0"/>
               <a:pPr/>
               <a:t>‹#›</a:t>
             </a:fld>
@@ -2500,6 +2530,11 @@
         </p:txBody>
       </p:sp>
     </p:spTree>
+    <p:extLst>
+      <p:ext uri="{BB962C8B-B14F-4D97-AF65-F5344CB8AC3E}">
+        <p14:creationId xmlns:p14="http://schemas.microsoft.com/office/powerpoint/2010/main" val="2158210448"/>
+      </p:ext>
+    </p:extLst>
   </p:cSld>
   <p:clrMapOvr>
     <a:masterClrMapping/>
@@ -2540,7 +2575,7 @@
           <a:lstStyle/>
           <a:p>
             <a:r>
-              <a:rPr lang="en-US"/>
+              <a:rPr lang="en-US" smtClean="0"/>
               <a:t>Click to edit Master title style</a:t>
             </a:r>
             <a:endParaRPr lang="en-US" dirty="0"/>
@@ -2564,35 +2599,35 @@
           <a:p>
             <a:pPr lvl="0"/>
             <a:r>
-              <a:rPr lang="en-US"/>
-              <a:t>Click to edit Master text styles</a:t>
+              <a:rPr lang="en-US" smtClean="0"/>
+              <a:t>Edit Master text styles</a:t>
             </a:r>
           </a:p>
           <a:p>
             <a:pPr lvl="1"/>
             <a:r>
-              <a:rPr lang="en-US"/>
+              <a:rPr lang="en-US" smtClean="0"/>
               <a:t>Second level</a:t>
             </a:r>
           </a:p>
           <a:p>
             <a:pPr lvl="2"/>
             <a:r>
-              <a:rPr lang="en-US"/>
+              <a:rPr lang="en-US" smtClean="0"/>
               <a:t>Third level</a:t>
             </a:r>
           </a:p>
           <a:p>
             <a:pPr lvl="3"/>
             <a:r>
-              <a:rPr lang="en-US"/>
+              <a:rPr lang="en-US" smtClean="0"/>
               <a:t>Fourth level</a:t>
             </a:r>
           </a:p>
           <a:p>
             <a:pPr lvl="4"/>
             <a:r>
-              <a:rPr lang="en-US"/>
+              <a:rPr lang="en-US" smtClean="0"/>
               <a:t>Fifth level</a:t>
             </a:r>
             <a:endParaRPr lang="en-US" dirty="0"/>
@@ -2615,8 +2650,8 @@
           <a:lstStyle/>
           <a:p>
             <a:fld id="{55C6B4A9-1611-4792-9094-5F34BCA07E0B}" type="datetimeFigureOut">
-              <a:rPr lang="en-US" dirty="0"/>
-              <a:t>11/17/2019</a:t>
+              <a:rPr lang="en-US" smtClean="0"/>
+              <a:t>11/20/2019</a:t>
             </a:fld>
             <a:endParaRPr lang="en-US" dirty="0"/>
           </a:p>
@@ -2657,7 +2692,7 @@
           <a:lstStyle/>
           <a:p>
             <a:fld id="{89333C77-0158-454C-844F-B7AB9BD7DAD4}" type="slidenum">
-              <a:rPr lang="en-US" dirty="0"/>
+              <a:rPr lang="en-US" smtClean="0"/>
               <a:t>‹#›</a:t>
             </a:fld>
             <a:endParaRPr lang="en-US" dirty="0"/>
@@ -2665,6 +2700,11 @@
         </p:txBody>
       </p:sp>
     </p:spTree>
+    <p:extLst>
+      <p:ext uri="{BB962C8B-B14F-4D97-AF65-F5344CB8AC3E}">
+        <p14:creationId xmlns:p14="http://schemas.microsoft.com/office/powerpoint/2010/main" val="4227885667"/>
+      </p:ext>
+    </p:extLst>
   </p:cSld>
   <p:clrMapOvr>
     <a:masterClrMapping/>
@@ -2710,7 +2750,7 @@
           <a:lstStyle/>
           <a:p>
             <a:r>
-              <a:rPr lang="en-US"/>
+              <a:rPr lang="en-US" smtClean="0"/>
               <a:t>Click to edit Master title style</a:t>
             </a:r>
             <a:endParaRPr lang="en-US" dirty="0"/>
@@ -2739,35 +2779,35 @@
           <a:p>
             <a:pPr lvl="0"/>
             <a:r>
-              <a:rPr lang="en-US"/>
-              <a:t>Click to edit Master text styles</a:t>
+              <a:rPr lang="en-US" smtClean="0"/>
+              <a:t>Edit Master text styles</a:t>
             </a:r>
           </a:p>
           <a:p>
             <a:pPr lvl="1"/>
             <a:r>
-              <a:rPr lang="en-US"/>
+              <a:rPr lang="en-US" smtClean="0"/>
               <a:t>Second level</a:t>
             </a:r>
           </a:p>
           <a:p>
             <a:pPr lvl="2"/>
             <a:r>
-              <a:rPr lang="en-US"/>
+              <a:rPr lang="en-US" smtClean="0"/>
               <a:t>Third level</a:t>
             </a:r>
           </a:p>
           <a:p>
             <a:pPr lvl="3"/>
             <a:r>
-              <a:rPr lang="en-US"/>
+              <a:rPr lang="en-US" smtClean="0"/>
               <a:t>Fourth level</a:t>
             </a:r>
           </a:p>
           <a:p>
             <a:pPr lvl="4"/>
             <a:r>
-              <a:rPr lang="en-US"/>
+              <a:rPr lang="en-US" smtClean="0"/>
               <a:t>Fifth level</a:t>
             </a:r>
             <a:endParaRPr lang="en-US" dirty="0"/>
@@ -2790,9 +2830,9 @@
           <a:lstStyle/>
           <a:p>
             <a:fld id="{B61BEF0D-F0BB-DE4B-95CE-6DB70DBA9567}" type="datetimeFigureOut">
-              <a:rPr lang="en-US" dirty="0"/>
+              <a:rPr lang="en-US" smtClean="0"/>
               <a:pPr/>
-              <a:t>11/17/2019</a:t>
+              <a:t>11/20/2019</a:t>
             </a:fld>
             <a:endParaRPr lang="en-US" dirty="0"/>
           </a:p>
@@ -2833,7 +2873,7 @@
           <a:lstStyle/>
           <a:p>
             <a:fld id="{D57F1E4F-1CFF-5643-939E-217C01CDF565}" type="slidenum">
-              <a:rPr lang="en-US" dirty="0"/>
+              <a:rPr lang="en-US" smtClean="0"/>
               <a:pPr/>
               <a:t>‹#›</a:t>
             </a:fld>
@@ -2842,6 +2882,11 @@
         </p:txBody>
       </p:sp>
     </p:spTree>
+    <p:extLst>
+      <p:ext uri="{BB962C8B-B14F-4D97-AF65-F5344CB8AC3E}">
+        <p14:creationId xmlns:p14="http://schemas.microsoft.com/office/powerpoint/2010/main" val="4139478859"/>
+      </p:ext>
+    </p:extLst>
   </p:cSld>
   <p:clrMapOvr>
     <a:masterClrMapping/>
@@ -2882,7 +2927,7 @@
           <a:lstStyle/>
           <a:p>
             <a:r>
-              <a:rPr lang="en-US"/>
+              <a:rPr lang="en-US" smtClean="0"/>
               <a:t>Click to edit Master title style</a:t>
             </a:r>
             <a:endParaRPr lang="en-US" dirty="0"/>
@@ -2906,35 +2951,35 @@
           <a:p>
             <a:pPr lvl="0"/>
             <a:r>
-              <a:rPr lang="en-US"/>
-              <a:t>Click to edit Master text styles</a:t>
+              <a:rPr lang="en-US" smtClean="0"/>
+              <a:t>Edit Master text styles</a:t>
             </a:r>
           </a:p>
           <a:p>
             <a:pPr lvl="1"/>
             <a:r>
-              <a:rPr lang="en-US"/>
+              <a:rPr lang="en-US" smtClean="0"/>
               <a:t>Second level</a:t>
             </a:r>
           </a:p>
           <a:p>
             <a:pPr lvl="2"/>
             <a:r>
-              <a:rPr lang="en-US"/>
+              <a:rPr lang="en-US" smtClean="0"/>
               <a:t>Third level</a:t>
             </a:r>
           </a:p>
           <a:p>
             <a:pPr lvl="3"/>
             <a:r>
-              <a:rPr lang="en-US"/>
+              <a:rPr lang="en-US" smtClean="0"/>
               <a:t>Fourth level</a:t>
             </a:r>
           </a:p>
           <a:p>
             <a:pPr lvl="4"/>
             <a:r>
-              <a:rPr lang="en-US"/>
+              <a:rPr lang="en-US" smtClean="0"/>
               <a:t>Fifth level</a:t>
             </a:r>
             <a:endParaRPr lang="en-US" dirty="0"/>
@@ -2957,8 +3002,8 @@
           <a:lstStyle/>
           <a:p>
             <a:fld id="{42A54C80-263E-416B-A8E0-580EDEADCBDC}" type="datetimeFigureOut">
-              <a:rPr lang="en-US" dirty="0"/>
-              <a:t>11/17/2019</a:t>
+              <a:rPr lang="en-US" smtClean="0"/>
+              <a:t>11/20/2019</a:t>
             </a:fld>
             <a:endParaRPr lang="en-US" dirty="0"/>
           </a:p>
@@ -2999,7 +3044,7 @@
           <a:lstStyle/>
           <a:p>
             <a:fld id="{519954A3-9DFD-4C44-94BA-B95130A3BA1C}" type="slidenum">
-              <a:rPr lang="en-US" dirty="0"/>
+              <a:rPr lang="en-US" smtClean="0"/>
               <a:t>‹#›</a:t>
             </a:fld>
             <a:endParaRPr lang="en-US" dirty="0"/>
@@ -3007,6 +3052,11 @@
         </p:txBody>
       </p:sp>
     </p:spTree>
+    <p:extLst>
+      <p:ext uri="{BB962C8B-B14F-4D97-AF65-F5344CB8AC3E}">
+        <p14:creationId xmlns:p14="http://schemas.microsoft.com/office/powerpoint/2010/main" val="3973586618"/>
+      </p:ext>
+    </p:extLst>
   </p:cSld>
   <p:clrMapOvr>
     <a:masterClrMapping/>
@@ -3056,7 +3106,7 @@
           </a:lstStyle>
           <a:p>
             <a:r>
-              <a:rPr lang="en-US"/>
+              <a:rPr lang="en-US" smtClean="0"/>
               <a:t>Click to edit Master title style</a:t>
             </a:r>
             <a:endParaRPr lang="en-US" dirty="0"/>
@@ -3177,8 +3227,8 @@
           <a:p>
             <a:pPr lvl="0"/>
             <a:r>
-              <a:rPr lang="en-US"/>
-              <a:t>Click to edit Master text styles</a:t>
+              <a:rPr lang="en-US" smtClean="0"/>
+              <a:t>Edit Master text styles</a:t>
             </a:r>
           </a:p>
         </p:txBody>
@@ -3199,9 +3249,9 @@
           <a:lstStyle/>
           <a:p>
             <a:fld id="{B61BEF0D-F0BB-DE4B-95CE-6DB70DBA9567}" type="datetimeFigureOut">
-              <a:rPr lang="en-US" dirty="0"/>
+              <a:rPr lang="en-US" smtClean="0"/>
               <a:pPr/>
-              <a:t>11/17/2019</a:t>
+              <a:t>11/20/2019</a:t>
             </a:fld>
             <a:endParaRPr lang="en-US" dirty="0"/>
           </a:p>
@@ -3242,7 +3292,7 @@
           <a:lstStyle/>
           <a:p>
             <a:fld id="{D57F1E4F-1CFF-5643-939E-217C01CDF565}" type="slidenum">
-              <a:rPr lang="en-US" dirty="0"/>
+              <a:rPr lang="en-US" smtClean="0"/>
               <a:pPr/>
               <a:t>‹#›</a:t>
             </a:fld>
@@ -3251,6 +3301,11 @@
         </p:txBody>
       </p:sp>
     </p:spTree>
+    <p:extLst>
+      <p:ext uri="{BB962C8B-B14F-4D97-AF65-F5344CB8AC3E}">
+        <p14:creationId xmlns:p14="http://schemas.microsoft.com/office/powerpoint/2010/main" val="3735021817"/>
+      </p:ext>
+    </p:extLst>
   </p:cSld>
   <p:clrMapOvr>
     <a:masterClrMapping/>
@@ -3291,7 +3346,7 @@
           <a:lstStyle/>
           <a:p>
             <a:r>
-              <a:rPr lang="en-US"/>
+              <a:rPr lang="en-US" smtClean="0"/>
               <a:t>Click to edit Master title style</a:t>
             </a:r>
             <a:endParaRPr lang="en-US" dirty="0"/>
@@ -3320,35 +3375,35 @@
           <a:p>
             <a:pPr lvl="0"/>
             <a:r>
-              <a:rPr lang="en-US"/>
-              <a:t>Click to edit Master text styles</a:t>
+              <a:rPr lang="en-US" smtClean="0"/>
+              <a:t>Edit Master text styles</a:t>
             </a:r>
           </a:p>
           <a:p>
             <a:pPr lvl="1"/>
             <a:r>
-              <a:rPr lang="en-US"/>
+              <a:rPr lang="en-US" smtClean="0"/>
               <a:t>Second level</a:t>
             </a:r>
           </a:p>
           <a:p>
             <a:pPr lvl="2"/>
             <a:r>
-              <a:rPr lang="en-US"/>
+              <a:rPr lang="en-US" smtClean="0"/>
               <a:t>Third level</a:t>
             </a:r>
           </a:p>
           <a:p>
             <a:pPr lvl="3"/>
             <a:r>
-              <a:rPr lang="en-US"/>
+              <a:rPr lang="en-US" smtClean="0"/>
               <a:t>Fourth level</a:t>
             </a:r>
           </a:p>
           <a:p>
             <a:pPr lvl="4"/>
             <a:r>
-              <a:rPr lang="en-US"/>
+              <a:rPr lang="en-US" smtClean="0"/>
               <a:t>Fifth level</a:t>
             </a:r>
             <a:endParaRPr lang="en-US" dirty="0"/>
@@ -3377,35 +3432,35 @@
           <a:p>
             <a:pPr lvl="0"/>
             <a:r>
-              <a:rPr lang="en-US"/>
-              <a:t>Click to edit Master text styles</a:t>
+              <a:rPr lang="en-US" smtClean="0"/>
+              <a:t>Edit Master text styles</a:t>
             </a:r>
           </a:p>
           <a:p>
             <a:pPr lvl="1"/>
             <a:r>
-              <a:rPr lang="en-US"/>
+              <a:rPr lang="en-US" smtClean="0"/>
               <a:t>Second level</a:t>
             </a:r>
           </a:p>
           <a:p>
             <a:pPr lvl="2"/>
             <a:r>
-              <a:rPr lang="en-US"/>
+              <a:rPr lang="en-US" smtClean="0"/>
               <a:t>Third level</a:t>
             </a:r>
           </a:p>
           <a:p>
             <a:pPr lvl="3"/>
             <a:r>
-              <a:rPr lang="en-US"/>
+              <a:rPr lang="en-US" smtClean="0"/>
               <a:t>Fourth level</a:t>
             </a:r>
           </a:p>
           <a:p>
             <a:pPr lvl="4"/>
             <a:r>
-              <a:rPr lang="en-US"/>
+              <a:rPr lang="en-US" smtClean="0"/>
               <a:t>Fifth level</a:t>
             </a:r>
             <a:endParaRPr lang="en-US" dirty="0"/>
@@ -3428,8 +3483,8 @@
           <a:lstStyle/>
           <a:p>
             <a:fld id="{42A54C80-263E-416B-A8E0-580EDEADCBDC}" type="datetimeFigureOut">
-              <a:rPr lang="en-US" dirty="0"/>
-              <a:t>11/17/2019</a:t>
+              <a:rPr lang="en-US" smtClean="0"/>
+              <a:t>11/20/2019</a:t>
             </a:fld>
             <a:endParaRPr lang="en-US" dirty="0"/>
           </a:p>
@@ -3470,7 +3525,7 @@
           <a:lstStyle/>
           <a:p>
             <a:fld id="{519954A3-9DFD-4C44-94BA-B95130A3BA1C}" type="slidenum">
-              <a:rPr lang="en-US" dirty="0"/>
+              <a:rPr lang="en-US" smtClean="0"/>
               <a:t>‹#›</a:t>
             </a:fld>
             <a:endParaRPr lang="en-US" dirty="0"/>
@@ -3478,6 +3533,11 @@
         </p:txBody>
       </p:sp>
     </p:spTree>
+    <p:extLst>
+      <p:ext uri="{BB962C8B-B14F-4D97-AF65-F5344CB8AC3E}">
+        <p14:creationId xmlns:p14="http://schemas.microsoft.com/office/powerpoint/2010/main" val="3868830175"/>
+      </p:ext>
+    </p:extLst>
   </p:cSld>
   <p:clrMapOvr>
     <a:masterClrMapping/>
@@ -3522,7 +3582,7 @@
           </a:lstStyle>
           <a:p>
             <a:r>
-              <a:rPr lang="en-US"/>
+              <a:rPr lang="en-US" smtClean="0"/>
               <a:t>Click to edit Master title style</a:t>
             </a:r>
             <a:endParaRPr lang="en-US" dirty="0"/>
@@ -3590,8 +3650,8 @@
           <a:p>
             <a:pPr lvl="0"/>
             <a:r>
-              <a:rPr lang="en-US"/>
-              <a:t>Click to edit Master text styles</a:t>
+              <a:rPr lang="en-US" smtClean="0"/>
+              <a:t>Edit Master text styles</a:t>
             </a:r>
           </a:p>
         </p:txBody>
@@ -3620,35 +3680,35 @@
           <a:p>
             <a:pPr lvl="0"/>
             <a:r>
-              <a:rPr lang="en-US"/>
-              <a:t>Click to edit Master text styles</a:t>
+              <a:rPr lang="en-US" smtClean="0"/>
+              <a:t>Edit Master text styles</a:t>
             </a:r>
           </a:p>
           <a:p>
             <a:pPr lvl="1"/>
             <a:r>
-              <a:rPr lang="en-US"/>
+              <a:rPr lang="en-US" smtClean="0"/>
               <a:t>Second level</a:t>
             </a:r>
           </a:p>
           <a:p>
             <a:pPr lvl="2"/>
             <a:r>
-              <a:rPr lang="en-US"/>
+              <a:rPr lang="en-US" smtClean="0"/>
               <a:t>Third level</a:t>
             </a:r>
           </a:p>
           <a:p>
             <a:pPr lvl="3"/>
             <a:r>
-              <a:rPr lang="en-US"/>
+              <a:rPr lang="en-US" smtClean="0"/>
               <a:t>Fourth level</a:t>
             </a:r>
           </a:p>
           <a:p>
             <a:pPr lvl="4"/>
             <a:r>
-              <a:rPr lang="en-US"/>
+              <a:rPr lang="en-US" smtClean="0"/>
               <a:t>Fifth level</a:t>
             </a:r>
             <a:endParaRPr lang="en-US" dirty="0"/>
@@ -3716,8 +3776,8 @@
           <a:p>
             <a:pPr lvl="0"/>
             <a:r>
-              <a:rPr lang="en-US"/>
-              <a:t>Click to edit Master text styles</a:t>
+              <a:rPr lang="en-US" smtClean="0"/>
+              <a:t>Edit Master text styles</a:t>
             </a:r>
           </a:p>
         </p:txBody>
@@ -3746,35 +3806,35 @@
           <a:p>
             <a:pPr lvl="0"/>
             <a:r>
-              <a:rPr lang="en-US"/>
-              <a:t>Click to edit Master text styles</a:t>
+              <a:rPr lang="en-US" smtClean="0"/>
+              <a:t>Edit Master text styles</a:t>
             </a:r>
           </a:p>
           <a:p>
             <a:pPr lvl="1"/>
             <a:r>
-              <a:rPr lang="en-US"/>
+              <a:rPr lang="en-US" smtClean="0"/>
               <a:t>Second level</a:t>
             </a:r>
           </a:p>
           <a:p>
             <a:pPr lvl="2"/>
             <a:r>
-              <a:rPr lang="en-US"/>
+              <a:rPr lang="en-US" smtClean="0"/>
               <a:t>Third level</a:t>
             </a:r>
           </a:p>
           <a:p>
             <a:pPr lvl="3"/>
             <a:r>
-              <a:rPr lang="en-US"/>
+              <a:rPr lang="en-US" smtClean="0"/>
               <a:t>Fourth level</a:t>
             </a:r>
           </a:p>
           <a:p>
             <a:pPr lvl="4"/>
             <a:r>
-              <a:rPr lang="en-US"/>
+              <a:rPr lang="en-US" smtClean="0"/>
               <a:t>Fifth level</a:t>
             </a:r>
             <a:endParaRPr lang="en-US" dirty="0"/>
@@ -3797,9 +3857,9 @@
           <a:lstStyle/>
           <a:p>
             <a:fld id="{B61BEF0D-F0BB-DE4B-95CE-6DB70DBA9567}" type="datetimeFigureOut">
-              <a:rPr lang="en-US" dirty="0"/>
+              <a:rPr lang="en-US" smtClean="0"/>
               <a:pPr/>
-              <a:t>11/17/2019</a:t>
+              <a:t>11/20/2019</a:t>
             </a:fld>
             <a:endParaRPr lang="en-US" dirty="0"/>
           </a:p>
@@ -3840,7 +3900,7 @@
           <a:lstStyle/>
           <a:p>
             <a:fld id="{D57F1E4F-1CFF-5643-939E-217C01CDF565}" type="slidenum">
-              <a:rPr lang="en-US" dirty="0"/>
+              <a:rPr lang="en-US" smtClean="0"/>
               <a:pPr/>
               <a:t>‹#›</a:t>
             </a:fld>
@@ -3849,6 +3909,11 @@
         </p:txBody>
       </p:sp>
     </p:spTree>
+    <p:extLst>
+      <p:ext uri="{BB962C8B-B14F-4D97-AF65-F5344CB8AC3E}">
+        <p14:creationId xmlns:p14="http://schemas.microsoft.com/office/powerpoint/2010/main" val="1111622647"/>
+      </p:ext>
+    </p:extLst>
   </p:cSld>
   <p:clrMapOvr>
     <a:masterClrMapping/>
@@ -3894,7 +3959,7 @@
           <a:lstStyle/>
           <a:p>
             <a:r>
-              <a:rPr lang="en-US"/>
+              <a:rPr lang="en-US" smtClean="0"/>
               <a:t>Click to edit Master title style</a:t>
             </a:r>
             <a:endParaRPr lang="en-US" dirty="0"/>
@@ -3917,9 +3982,9 @@
           <a:lstStyle/>
           <a:p>
             <a:fld id="{B61BEF0D-F0BB-DE4B-95CE-6DB70DBA9567}" type="datetimeFigureOut">
-              <a:rPr lang="en-US" dirty="0"/>
+              <a:rPr lang="en-US" smtClean="0"/>
               <a:pPr/>
-              <a:t>11/17/2019</a:t>
+              <a:t>11/20/2019</a:t>
             </a:fld>
             <a:endParaRPr lang="en-US" dirty="0"/>
           </a:p>
@@ -3960,7 +4025,7 @@
           <a:lstStyle/>
           <a:p>
             <a:fld id="{D57F1E4F-1CFF-5643-939E-217C01CDF565}" type="slidenum">
-              <a:rPr lang="en-US" dirty="0"/>
+              <a:rPr lang="en-US" smtClean="0"/>
               <a:pPr/>
               <a:t>‹#›</a:t>
             </a:fld>
@@ -3969,6 +4034,11 @@
         </p:txBody>
       </p:sp>
     </p:spTree>
+    <p:extLst>
+      <p:ext uri="{BB962C8B-B14F-4D97-AF65-F5344CB8AC3E}">
+        <p14:creationId xmlns:p14="http://schemas.microsoft.com/office/powerpoint/2010/main" val="3004976882"/>
+      </p:ext>
+    </p:extLst>
   </p:cSld>
   <p:clrMapOvr>
     <a:masterClrMapping/>
@@ -4009,9 +4079,9 @@
           <a:lstStyle/>
           <a:p>
             <a:fld id="{B61BEF0D-F0BB-DE4B-95CE-6DB70DBA9567}" type="datetimeFigureOut">
-              <a:rPr lang="en-US" dirty="0"/>
+              <a:rPr lang="en-US" smtClean="0"/>
               <a:pPr/>
-              <a:t>11/17/2019</a:t>
+              <a:t>11/20/2019</a:t>
             </a:fld>
             <a:endParaRPr lang="en-US" dirty="0"/>
           </a:p>
@@ -4052,7 +4122,7 @@
           <a:lstStyle/>
           <a:p>
             <a:fld id="{D57F1E4F-1CFF-5643-939E-217C01CDF565}" type="slidenum">
-              <a:rPr lang="en-US" dirty="0"/>
+              <a:rPr lang="en-US" smtClean="0"/>
               <a:pPr/>
               <a:t>‹#›</a:t>
             </a:fld>
@@ -4061,6 +4131,11 @@
         </p:txBody>
       </p:sp>
     </p:spTree>
+    <p:extLst>
+      <p:ext uri="{BB962C8B-B14F-4D97-AF65-F5344CB8AC3E}">
+        <p14:creationId xmlns:p14="http://schemas.microsoft.com/office/powerpoint/2010/main" val="73627805"/>
+      </p:ext>
+    </p:extLst>
   </p:cSld>
   <p:clrMapOvr>
     <a:masterClrMapping/>
@@ -4112,7 +4187,7 @@
           </a:lstStyle>
           <a:p>
             <a:r>
-              <a:rPr lang="en-US"/>
+              <a:rPr lang="en-US" smtClean="0"/>
               <a:t>Click to edit Master title style</a:t>
             </a:r>
             <a:endParaRPr lang="en-US" dirty="0"/>
@@ -4143,35 +4218,35 @@
           <a:p>
             <a:pPr lvl="0"/>
             <a:r>
-              <a:rPr lang="en-US"/>
-              <a:t>Click to edit Master text styles</a:t>
+              <a:rPr lang="en-US" smtClean="0"/>
+              <a:t>Edit Master text styles</a:t>
             </a:r>
           </a:p>
           <a:p>
             <a:pPr lvl="1"/>
             <a:r>
-              <a:rPr lang="en-US"/>
+              <a:rPr lang="en-US" smtClean="0"/>
               <a:t>Second level</a:t>
             </a:r>
           </a:p>
           <a:p>
             <a:pPr lvl="2"/>
             <a:r>
-              <a:rPr lang="en-US"/>
+              <a:rPr lang="en-US" smtClean="0"/>
               <a:t>Third level</a:t>
             </a:r>
           </a:p>
           <a:p>
             <a:pPr lvl="3"/>
             <a:r>
-              <a:rPr lang="en-US"/>
+              <a:rPr lang="en-US" smtClean="0"/>
               <a:t>Fourth level</a:t>
             </a:r>
           </a:p>
           <a:p>
             <a:pPr lvl="4"/>
             <a:r>
-              <a:rPr lang="en-US"/>
+              <a:rPr lang="en-US" smtClean="0"/>
               <a:t>Fifth level</a:t>
             </a:r>
             <a:endParaRPr lang="en-US" dirty="0"/>
@@ -4239,8 +4314,8 @@
           <a:p>
             <a:pPr lvl="0"/>
             <a:r>
-              <a:rPr lang="en-US"/>
-              <a:t>Click to edit Master text styles</a:t>
+              <a:rPr lang="en-US" smtClean="0"/>
+              <a:t>Edit Master text styles</a:t>
             </a:r>
           </a:p>
         </p:txBody>
@@ -4261,8 +4336,8 @@
           <a:lstStyle/>
           <a:p>
             <a:fld id="{42A54C80-263E-416B-A8E0-580EDEADCBDC}" type="datetimeFigureOut">
-              <a:rPr lang="en-US" dirty="0"/>
-              <a:t>11/17/2019</a:t>
+              <a:rPr lang="en-US" smtClean="0"/>
+              <a:t>11/20/2019</a:t>
             </a:fld>
             <a:endParaRPr lang="en-US" dirty="0"/>
           </a:p>
@@ -4303,7 +4378,7 @@
           <a:lstStyle/>
           <a:p>
             <a:fld id="{519954A3-9DFD-4C44-94BA-B95130A3BA1C}" type="slidenum">
-              <a:rPr lang="en-US" dirty="0"/>
+              <a:rPr lang="en-US" smtClean="0"/>
               <a:t>‹#›</a:t>
             </a:fld>
             <a:endParaRPr lang="en-US" dirty="0"/>
@@ -4311,6 +4386,11 @@
         </p:txBody>
       </p:sp>
     </p:spTree>
+    <p:extLst>
+      <p:ext uri="{BB962C8B-B14F-4D97-AF65-F5344CB8AC3E}">
+        <p14:creationId xmlns:p14="http://schemas.microsoft.com/office/powerpoint/2010/main" val="4236137069"/>
+      </p:ext>
+    </p:extLst>
   </p:cSld>
   <p:clrMapOvr>
     <a:masterClrMapping/>
@@ -4362,7 +4442,7 @@
           </a:lstStyle>
           <a:p>
             <a:r>
-              <a:rPr lang="en-US"/>
+              <a:rPr lang="en-US" smtClean="0"/>
               <a:t>Click to edit Master title style</a:t>
             </a:r>
             <a:endParaRPr lang="en-US" dirty="0"/>
@@ -4429,7 +4509,7 @@
           </a:lstStyle>
           <a:p>
             <a:r>
-              <a:rPr lang="en-US"/>
+              <a:rPr lang="en-US" smtClean="0"/>
               <a:t>Click icon to add picture</a:t>
             </a:r>
             <a:endParaRPr lang="en-US" dirty="0"/>
@@ -4497,8 +4577,8 @@
           <a:p>
             <a:pPr lvl="0"/>
             <a:r>
-              <a:rPr lang="en-US"/>
-              <a:t>Click to edit Master text styles</a:t>
+              <a:rPr lang="en-US" smtClean="0"/>
+              <a:t>Edit Master text styles</a:t>
             </a:r>
           </a:p>
         </p:txBody>
@@ -4538,7 +4618,7 @@
           <a:lstStyle/>
           <a:p>
             <a:fld id="{D57F1E4F-1CFF-5643-939E-217C01CDF565}" type="slidenum">
-              <a:rPr lang="en-US" dirty="0"/>
+              <a:rPr lang="en-US" smtClean="0"/>
               <a:pPr/>
               <a:t>‹#›</a:t>
             </a:fld>
@@ -4562,15 +4642,20 @@
           <a:lstStyle/>
           <a:p>
             <a:fld id="{B61BEF0D-F0BB-DE4B-95CE-6DB70DBA9567}" type="datetimeFigureOut">
-              <a:rPr lang="en-US" dirty="0"/>
+              <a:rPr lang="en-US" smtClean="0"/>
               <a:pPr/>
-              <a:t>11/17/2019</a:t>
+              <a:t>11/20/2019</a:t>
             </a:fld>
             <a:endParaRPr lang="en-US" dirty="0"/>
           </a:p>
         </p:txBody>
       </p:sp>
     </p:spTree>
+    <p:extLst>
+      <p:ext uri="{BB962C8B-B14F-4D97-AF65-F5344CB8AC3E}">
+        <p14:creationId xmlns:p14="http://schemas.microsoft.com/office/powerpoint/2010/main" val="1221841844"/>
+      </p:ext>
+    </p:extLst>
   </p:cSld>
   <p:clrMapOvr>
     <a:masterClrMapping/>
@@ -5157,7 +5242,7 @@
           <a:lstStyle/>
           <a:p>
             <a:r>
-              <a:rPr lang="en-US"/>
+              <a:rPr lang="en-US" smtClean="0"/>
               <a:t>Click to edit Master title style</a:t>
             </a:r>
             <a:endParaRPr lang="en-US" dirty="0"/>
@@ -5191,35 +5276,35 @@
           <a:p>
             <a:pPr lvl="0"/>
             <a:r>
-              <a:rPr lang="en-US"/>
-              <a:t>Click to edit Master text styles</a:t>
+              <a:rPr lang="en-US" smtClean="0"/>
+              <a:t>Edit Master text styles</a:t>
             </a:r>
           </a:p>
           <a:p>
             <a:pPr lvl="1"/>
             <a:r>
-              <a:rPr lang="en-US"/>
+              <a:rPr lang="en-US" smtClean="0"/>
               <a:t>Second level</a:t>
             </a:r>
           </a:p>
           <a:p>
             <a:pPr lvl="2"/>
             <a:r>
-              <a:rPr lang="en-US"/>
+              <a:rPr lang="en-US" smtClean="0"/>
               <a:t>Third level</a:t>
             </a:r>
           </a:p>
           <a:p>
             <a:pPr lvl="3"/>
             <a:r>
-              <a:rPr lang="en-US"/>
+              <a:rPr lang="en-US" smtClean="0"/>
               <a:t>Fourth level</a:t>
             </a:r>
           </a:p>
           <a:p>
             <a:pPr lvl="4"/>
             <a:r>
-              <a:rPr lang="en-US"/>
+              <a:rPr lang="en-US" smtClean="0"/>
               <a:t>Fifth level</a:t>
             </a:r>
             <a:endParaRPr lang="en-US" dirty="0"/>
@@ -5260,9 +5345,9 @@
           </a:lstStyle>
           <a:p>
             <a:fld id="{B61BEF0D-F0BB-DE4B-95CE-6DB70DBA9567}" type="datetimeFigureOut">
-              <a:rPr lang="en-US" dirty="0"/>
+              <a:rPr lang="en-US" smtClean="0"/>
               <a:pPr/>
-              <a:t>11/17/2019</a:t>
+              <a:t>11/20/2019</a:t>
             </a:fld>
             <a:endParaRPr lang="en-US" dirty="0"/>
           </a:p>
@@ -5337,7 +5422,7 @@
           </a:lstStyle>
           <a:p>
             <a:fld id="{D57F1E4F-1CFF-5643-939E-217C01CDF565}" type="slidenum">
-              <a:rPr lang="en-US" dirty="0"/>
+              <a:rPr lang="en-US" smtClean="0"/>
               <a:pPr/>
               <a:t>‹#›</a:t>
             </a:fld>
@@ -5346,25 +5431,30 @@
         </p:txBody>
       </p:sp>
     </p:spTree>
+    <p:extLst>
+      <p:ext uri="{BB962C8B-B14F-4D97-AF65-F5344CB8AC3E}">
+        <p14:creationId xmlns:p14="http://schemas.microsoft.com/office/powerpoint/2010/main" val="4140926450"/>
+      </p:ext>
+    </p:extLst>
   </p:cSld>
   <p:clrMap bg1="lt1" tx1="dk1" bg2="lt2" tx2="dk2" accent1="accent1" accent2="accent2" accent3="accent3" accent4="accent4" accent5="accent5" accent6="accent6" hlink="hlink" folHlink="folHlink"/>
   <p:sldLayoutIdLst>
-    <p:sldLayoutId id="2147483649" r:id="rId1"/>
-    <p:sldLayoutId id="2147483665" r:id="rId2"/>
-    <p:sldLayoutId id="2147483651" r:id="rId3"/>
-    <p:sldLayoutId id="2147483666" r:id="rId4"/>
-    <p:sldLayoutId id="2147483653" r:id="rId5"/>
-    <p:sldLayoutId id="2147483654" r:id="rId6"/>
-    <p:sldLayoutId id="2147483655" r:id="rId7"/>
-    <p:sldLayoutId id="2147483667" r:id="rId8"/>
-    <p:sldLayoutId id="2147483657" r:id="rId9"/>
-    <p:sldLayoutId id="2147483660" r:id="rId10"/>
-    <p:sldLayoutId id="2147483661" r:id="rId11"/>
-    <p:sldLayoutId id="2147483662" r:id="rId12"/>
-    <p:sldLayoutId id="2147483663" r:id="rId13"/>
-    <p:sldLayoutId id="2147483664" r:id="rId14"/>
-    <p:sldLayoutId id="2147483668" r:id="rId15"/>
-    <p:sldLayoutId id="2147483659" r:id="rId16"/>
+    <p:sldLayoutId id="2147483687" r:id="rId1"/>
+    <p:sldLayoutId id="2147483688" r:id="rId2"/>
+    <p:sldLayoutId id="2147483689" r:id="rId3"/>
+    <p:sldLayoutId id="2147483690" r:id="rId4"/>
+    <p:sldLayoutId id="2147483691" r:id="rId5"/>
+    <p:sldLayoutId id="2147483692" r:id="rId6"/>
+    <p:sldLayoutId id="2147483693" r:id="rId7"/>
+    <p:sldLayoutId id="2147483694" r:id="rId8"/>
+    <p:sldLayoutId id="2147483695" r:id="rId9"/>
+    <p:sldLayoutId id="2147483696" r:id="rId10"/>
+    <p:sldLayoutId id="2147483697" r:id="rId11"/>
+    <p:sldLayoutId id="2147483698" r:id="rId12"/>
+    <p:sldLayoutId id="2147483699" r:id="rId13"/>
+    <p:sldLayoutId id="2147483700" r:id="rId14"/>
+    <p:sldLayoutId id="2147483701" r:id="rId15"/>
+    <p:sldLayoutId id="2147483702" r:id="rId16"/>
   </p:sldLayoutIdLst>
   <p:txStyles>
     <p:titleStyle>
@@ -5954,7 +6044,15 @@
           <a:p>
             <a:r>
               <a:rPr lang="en-US" dirty="0"/>
-              <a:t>Contains 32k rows of data.</a:t>
+              <a:t>Contains </a:t>
+            </a:r>
+            <a:r>
+              <a:rPr lang="en-US" dirty="0" smtClean="0"/>
+              <a:t>32561 </a:t>
+            </a:r>
+            <a:r>
+              <a:rPr lang="en-US" dirty="0"/>
+              <a:t>rows of data.</a:t>
             </a:r>
           </a:p>
         </p:txBody>
@@ -6045,8 +6143,8 @@
         </p:blipFill>
         <p:spPr>
           <a:xfrm>
-            <a:off x="1386204" y="2817615"/>
-            <a:ext cx="7288987" cy="3009996"/>
+            <a:off x="1985015" y="2866168"/>
+            <a:ext cx="5982007" cy="2470277"/>
           </a:xfrm>
           <a:prstGeom prst="rect">
             <a:avLst/>
@@ -6135,8 +6233,8 @@
         </p:blipFill>
         <p:spPr>
           <a:xfrm>
-            <a:off x="2391605" y="2560081"/>
-            <a:ext cx="5391468" cy="3279171"/>
+            <a:off x="2908738" y="2000052"/>
+            <a:ext cx="5283221" cy="3213334"/>
           </a:xfrm>
           <a:prstGeom prst="rect">
             <a:avLst/>
@@ -6199,6 +6297,10 @@
           <a:bodyPr/>
           <a:lstStyle/>
           <a:p>
+            <a:r>
+              <a:rPr lang="en-US" dirty="0" smtClean="0"/>
+              <a:t>Ethnic group distribution</a:t>
+            </a:r>
             <a:endParaRPr lang="en-US" dirty="0"/>
           </a:p>
         </p:txBody>
@@ -6227,8 +6329,8 @@
         </p:blipFill>
         <p:spPr>
           <a:xfrm>
-            <a:off x="1980390" y="2174496"/>
-            <a:ext cx="6467695" cy="4683504"/>
+            <a:off x="2072584" y="1398370"/>
+            <a:ext cx="6978724" cy="5053559"/>
           </a:xfrm>
           <a:prstGeom prst="rect">
             <a:avLst/>

</xml_diff>